<commit_message>
Saving pdf version of presentations
</commit_message>
<xml_diff>
--- a/presentations/software_for_data_science_git.pptx
+++ b/presentations/software_for_data_science_git.pptx
@@ -1151,11 +1151,7 @@
           <a:p>
             <a:r>
               <a:rPr lang="en-US" dirty="0"/>
-              <a:t>Best way to learn git is by using it – or not using it and losing work and thus realizing you need to make an improvement in </a:t>
-            </a:r>
-            <a:r>
-              <a:rPr lang="en-US"/>
-              <a:t>this area.</a:t>
+              <a:t>Best way to learn git is by using it – or not using it and losing work and thus realizing you need to make an improvement in this area.</a:t>
             </a:r>
           </a:p>
         </p:txBody>

</xml_diff>